<commit_message>
added the schmuker dataset
</commit_message>
<xml_diff>
--- a/presentations/initial_viz.pptx
+++ b/presentations/initial_viz.pptx
@@ -274,7 +274,7 @@
           <a:p>
             <a:fld id="{19044222-8934-C842-A516-A076F2DCA693}" type="datetimeFigureOut">
               <a:rPr lang="en-US" smtClean="0"/>
-              <a:t>1/7/25</a:t>
+              <a:t>1/29/25</a:t>
             </a:fld>
             <a:endParaRPr lang="en-US"/>
           </a:p>
@@ -472,7 +472,7 @@
           <a:p>
             <a:fld id="{19044222-8934-C842-A516-A076F2DCA693}" type="datetimeFigureOut">
               <a:rPr lang="en-US" smtClean="0"/>
-              <a:t>1/7/25</a:t>
+              <a:t>1/29/25</a:t>
             </a:fld>
             <a:endParaRPr lang="en-US"/>
           </a:p>
@@ -680,7 +680,7 @@
           <a:p>
             <a:fld id="{19044222-8934-C842-A516-A076F2DCA693}" type="datetimeFigureOut">
               <a:rPr lang="en-US" smtClean="0"/>
-              <a:t>1/7/25</a:t>
+              <a:t>1/29/25</a:t>
             </a:fld>
             <a:endParaRPr lang="en-US"/>
           </a:p>
@@ -878,7 +878,7 @@
           <a:p>
             <a:fld id="{19044222-8934-C842-A516-A076F2DCA693}" type="datetimeFigureOut">
               <a:rPr lang="en-US" smtClean="0"/>
-              <a:t>1/7/25</a:t>
+              <a:t>1/29/25</a:t>
             </a:fld>
             <a:endParaRPr lang="en-US"/>
           </a:p>
@@ -1153,7 +1153,7 @@
           <a:p>
             <a:fld id="{19044222-8934-C842-A516-A076F2DCA693}" type="datetimeFigureOut">
               <a:rPr lang="en-US" smtClean="0"/>
-              <a:t>1/7/25</a:t>
+              <a:t>1/29/25</a:t>
             </a:fld>
             <a:endParaRPr lang="en-US"/>
           </a:p>
@@ -1418,7 +1418,7 @@
           <a:p>
             <a:fld id="{19044222-8934-C842-A516-A076F2DCA693}" type="datetimeFigureOut">
               <a:rPr lang="en-US" smtClean="0"/>
-              <a:t>1/7/25</a:t>
+              <a:t>1/29/25</a:t>
             </a:fld>
             <a:endParaRPr lang="en-US"/>
           </a:p>
@@ -1830,7 +1830,7 @@
           <a:p>
             <a:fld id="{19044222-8934-C842-A516-A076F2DCA693}" type="datetimeFigureOut">
               <a:rPr lang="en-US" smtClean="0"/>
-              <a:t>1/7/25</a:t>
+              <a:t>1/29/25</a:t>
             </a:fld>
             <a:endParaRPr lang="en-US"/>
           </a:p>
@@ -1971,7 +1971,7 @@
           <a:p>
             <a:fld id="{19044222-8934-C842-A516-A076F2DCA693}" type="datetimeFigureOut">
               <a:rPr lang="en-US" smtClean="0"/>
-              <a:t>1/7/25</a:t>
+              <a:t>1/29/25</a:t>
             </a:fld>
             <a:endParaRPr lang="en-US"/>
           </a:p>
@@ -2084,7 +2084,7 @@
           <a:p>
             <a:fld id="{19044222-8934-C842-A516-A076F2DCA693}" type="datetimeFigureOut">
               <a:rPr lang="en-US" smtClean="0"/>
-              <a:t>1/7/25</a:t>
+              <a:t>1/29/25</a:t>
             </a:fld>
             <a:endParaRPr lang="en-US"/>
           </a:p>
@@ -2395,7 +2395,7 @@
           <a:p>
             <a:fld id="{19044222-8934-C842-A516-A076F2DCA693}" type="datetimeFigureOut">
               <a:rPr lang="en-US" smtClean="0"/>
-              <a:t>1/7/25</a:t>
+              <a:t>1/29/25</a:t>
             </a:fld>
             <a:endParaRPr lang="en-US"/>
           </a:p>
@@ -2683,7 +2683,7 @@
           <a:p>
             <a:fld id="{19044222-8934-C842-A516-A076F2DCA693}" type="datetimeFigureOut">
               <a:rPr lang="en-US" smtClean="0"/>
-              <a:t>1/7/25</a:t>
+              <a:t>1/29/25</a:t>
             </a:fld>
             <a:endParaRPr lang="en-US"/>
           </a:p>
@@ -2924,7 +2924,7 @@
           <a:p>
             <a:fld id="{19044222-8934-C842-A516-A076F2DCA693}" type="datetimeFigureOut">
               <a:rPr lang="en-US" smtClean="0"/>
-              <a:t>1/7/25</a:t>
+              <a:t>1/29/25</a:t>
             </a:fld>
             <a:endParaRPr lang="en-US"/>
           </a:p>
@@ -4111,7 +4111,7 @@
             </a:r>
             <a:r>
               <a:rPr lang="en-US" dirty="0" err="1"/>
-              <a:t>davis</a:t>
+              <a:t>bindingDB</a:t>
             </a:r>
             <a:r>
               <a:rPr lang="en-US" dirty="0"/>
@@ -4129,7 +4129,7 @@
             </a:r>
             <a:r>
               <a:rPr lang="en-US" dirty="0" err="1"/>
-              <a:t>davis</a:t>
+              <a:t>bindingDB</a:t>
             </a:r>
             <a:r>
               <a:rPr lang="en-US" dirty="0"/>
@@ -4145,31 +4145,9 @@
             </a:r>
           </a:p>
           <a:p>
-            <a:r>
-              <a:rPr lang="en-US" dirty="0" err="1"/>
-              <a:t>Prosmith</a:t>
-            </a:r>
-            <a:r>
-              <a:rPr lang="en-US" dirty="0"/>
-              <a:t> HC -&gt; test itself</a:t>
-            </a:r>
-          </a:p>
-          <a:p>
-            <a:r>
-              <a:rPr lang="en-US" dirty="0" err="1"/>
-              <a:t>Prosmith</a:t>
-            </a:r>
-            <a:r>
-              <a:rPr lang="en-US" dirty="0"/>
-              <a:t> HC -&gt; test </a:t>
-            </a:r>
-            <a:r>
-              <a:rPr lang="en-US" dirty="0" err="1"/>
-              <a:t>carey</a:t>
-            </a:r>
-            <a:endParaRPr lang="en-US" dirty="0"/>
-          </a:p>
-          <a:p>
+            <a:pPr marL="0" indent="0">
+              <a:buNone/>
+            </a:pPr>
             <a:endParaRPr lang="en-US" dirty="0"/>
           </a:p>
           <a:p>

</xml_diff>